<commit_message>
edit ppt yang katanya ruang lingkup slide 3 tp laporan 2
</commit_message>
<xml_diff>
--- a/TA final/TA PRESENTASI.pptx
+++ b/TA final/TA PRESENTASI.pptx
@@ -350,7 +350,7 @@
             <a:fld id="{08B9EBBA-996F-894A-B54A-D6246ED52CEA}" type="datetimeFigureOut">
               <a:rPr lang="en-US" smtClean="0"/>
               <a:pPr/>
-              <a:t>8/11/2016</a:t>
+              <a:t>8/19/2016</a:t>
             </a:fld>
             <a:endParaRPr lang="en-US" dirty="0"/>
           </a:p>
@@ -560,7 +560,7 @@
             <a:fld id="{C6C52C72-DE31-F449-A4ED-4C594FD91407}" type="datetimeFigureOut">
               <a:rPr lang="en-US" smtClean="0"/>
               <a:pPr/>
-              <a:t>8/11/2016</a:t>
+              <a:t>8/19/2016</a:t>
             </a:fld>
             <a:endParaRPr lang="en-US" dirty="0"/>
           </a:p>
@@ -818,7 +818,7 @@
             <a:fld id="{ED62726E-379B-B349-9EED-81ED093FA806}" type="datetimeFigureOut">
               <a:rPr lang="en-US" smtClean="0"/>
               <a:pPr/>
-              <a:t>8/11/2016</a:t>
+              <a:t>8/19/2016</a:t>
             </a:fld>
             <a:endParaRPr lang="en-US" dirty="0"/>
           </a:p>
@@ -990,7 +990,7 @@
             <a:fld id="{9B3A1323-8D79-1946-B0D7-40001CF92E9D}" type="datetimeFigureOut">
               <a:rPr lang="en-US" smtClean="0"/>
               <a:pPr/>
-              <a:t>8/11/2016</a:t>
+              <a:t>8/19/2016</a:t>
             </a:fld>
             <a:endParaRPr lang="en-US" dirty="0"/>
           </a:p>
@@ -1335,7 +1335,7 @@
             <a:fld id="{8DFA1846-DA80-1C48-A609-854EA85C59AD}" type="datetimeFigureOut">
               <a:rPr lang="en-US" smtClean="0"/>
               <a:pPr/>
-              <a:t>8/11/2016</a:t>
+              <a:t>8/19/2016</a:t>
             </a:fld>
             <a:endParaRPr lang="en-US" dirty="0"/>
           </a:p>
@@ -1612,7 +1612,7 @@
             <a:fld id="{57302355-E14B-8545-A8F8-0FE83CC9D524}" type="datetimeFigureOut">
               <a:rPr lang="en-US" smtClean="0"/>
               <a:pPr/>
-              <a:t>8/11/2016</a:t>
+              <a:t>8/19/2016</a:t>
             </a:fld>
             <a:endParaRPr lang="en-US" dirty="0"/>
           </a:p>
@@ -1993,7 +1993,7 @@
             <a:fld id="{02640F58-564D-2B4F-AE67-E407BA4FCF45}" type="datetimeFigureOut">
               <a:rPr lang="en-US" smtClean="0"/>
               <a:pPr/>
-              <a:t>8/11/2016</a:t>
+              <a:t>8/19/2016</a:t>
             </a:fld>
             <a:endParaRPr lang="en-US" dirty="0"/>
           </a:p>
@@ -2113,7 +2113,7 @@
             <a:fld id="{F13A34C8-038E-2045-AF43-DF7DBB8E0E9E}" type="datetimeFigureOut">
               <a:rPr lang="en-US" smtClean="0"/>
               <a:pPr/>
-              <a:t>8/11/2016</a:t>
+              <a:t>8/19/2016</a:t>
             </a:fld>
             <a:endParaRPr lang="en-US" dirty="0"/>
           </a:p>
@@ -2286,7 +2286,7 @@
             <a:fld id="{8818C68F-D26B-8F47-958C-23B49CF8A634}" type="datetimeFigureOut">
               <a:rPr lang="en-US" smtClean="0"/>
               <a:pPr/>
-              <a:t>8/11/2016</a:t>
+              <a:t>8/19/2016</a:t>
             </a:fld>
             <a:endParaRPr lang="en-US" dirty="0"/>
           </a:p>
@@ -2642,7 +2642,7 @@
             <a:fld id="{D0DF5E60-9974-AC48-9591-99C2BB44B7CF}" type="datetimeFigureOut">
               <a:rPr lang="en-US" smtClean="0"/>
               <a:pPr/>
-              <a:t>8/11/2016</a:t>
+              <a:t>8/19/2016</a:t>
             </a:fld>
             <a:endParaRPr lang="en-US" dirty="0"/>
           </a:p>
@@ -3021,7 +3021,7 @@
             <a:fld id="{18C79C5D-2A6F-F04D-97DA-BEF2467B64E4}" type="datetimeFigureOut">
               <a:rPr lang="en-US" smtClean="0"/>
               <a:pPr/>
-              <a:t>8/11/2016</a:t>
+              <a:t>8/19/2016</a:t>
             </a:fld>
             <a:endParaRPr lang="en-US" dirty="0"/>
           </a:p>
@@ -3310,7 +3310,7 @@
             <a:fld id="{09B482E8-6E0E-1B4F-B1FD-C69DB9E858D9}" type="datetimeFigureOut">
               <a:rPr lang="en-US" smtClean="0"/>
               <a:pPr/>
-              <a:t>8/11/2016</a:t>
+              <a:t>8/19/2016</a:t>
             </a:fld>
             <a:endParaRPr lang="en-US" dirty="0"/>
           </a:p>
@@ -5431,19 +5431,28 @@
               <a:t>ujian</a:t>
             </a:r>
             <a:r>
+              <a:rPr lang="en-US" sz="2800" dirty="0"/>
+              <a:t> </a:t>
+            </a:r>
+            <a:r>
+              <a:rPr lang="en-US" sz="2800" dirty="0" err="1" smtClean="0"/>
+              <a:t>sedangkan</a:t>
+            </a:r>
+            <a:r>
               <a:rPr lang="en-US" sz="2800" dirty="0" smtClean="0"/>
-              <a:t>.</a:t>
-            </a:r>
-            <a:endParaRPr lang="id-ID" sz="2800" dirty="0" smtClean="0"/>
-          </a:p>
-          <a:p>
-            <a:pPr marL="514350" indent="-514350" algn="just">
-              <a:buFont typeface="+mj-lt"/>
-              <a:buAutoNum type="arabicPeriod"/>
-            </a:pPr>
+              <a:t> </a:t>
+            </a:r>
+            <a:r>
+              <a:rPr lang="en-US" sz="2800" dirty="0" err="1"/>
+              <a:t>d</a:t>
+            </a:r>
+            <a:r>
+              <a:rPr lang="en-US" sz="2800" dirty="0" err="1" smtClean="0"/>
+              <a:t>ari</a:t>
+            </a:r>
             <a:r>
               <a:rPr lang="en-US" sz="2800" dirty="0" smtClean="0"/>
-              <a:t>Dari </a:t>
+              <a:t> </a:t>
             </a:r>
             <a:r>
               <a:rPr lang="en-US" sz="2800" dirty="0" err="1" smtClean="0"/>

</xml_diff>